<commit_message>
Refreshed Prices for App Server, Changed Text for ASR
Refreshed Prices for App Server, Changed Text for ASR
</commit_message>
<xml_diff>
--- a/Content/Starter Kit - Azure Site Recovery/0 - One Slide - StarterKit - Site Recovery.pptx
+++ b/Content/Starter Kit - Azure Site Recovery/0 - One Slide - StarterKit - Site Recovery.pptx
@@ -198,7 +198,7 @@
           <a:p>
             <a:fld id="{386A5666-4B6A-423A-AB1B-8D7E7E0D4931}" type="datetimeFigureOut">
               <a:rPr lang="en-US" smtClean="0"/>
-              <a:t>9/23/2015</a:t>
+              <a:t>25-Mar-16</a:t>
             </a:fld>
             <a:endParaRPr lang="en-US"/>
           </a:p>
@@ -262,38 +262,37 @@
           <a:p>
             <a:pPr lvl="0"/>
             <a:r>
-              <a:rPr lang="en-US" smtClean="0"/>
+              <a:rPr lang="en-US"/>
               <a:t>Click to edit Master text styles</a:t>
             </a:r>
           </a:p>
           <a:p>
             <a:pPr lvl="1"/>
             <a:r>
-              <a:rPr lang="en-US" smtClean="0"/>
+              <a:rPr lang="en-US"/>
               <a:t>Second level</a:t>
             </a:r>
           </a:p>
           <a:p>
             <a:pPr lvl="2"/>
             <a:r>
-              <a:rPr lang="en-US" smtClean="0"/>
+              <a:rPr lang="en-US"/>
               <a:t>Third level</a:t>
             </a:r>
           </a:p>
           <a:p>
             <a:pPr lvl="3"/>
             <a:r>
-              <a:rPr lang="en-US" smtClean="0"/>
+              <a:rPr lang="en-US"/>
               <a:t>Fourth level</a:t>
             </a:r>
           </a:p>
           <a:p>
             <a:pPr lvl="4"/>
             <a:r>
-              <a:rPr lang="en-US" smtClean="0"/>
+              <a:rPr lang="en-US"/>
               <a:t>Fifth level</a:t>
             </a:r>
-            <a:endParaRPr lang="en-US"/>
           </a:p>
         </p:txBody>
       </p:sp>
@@ -511,34 +510,34 @@
           <a:lstStyle/>
           <a:p>
             <a:r>
-              <a:rPr lang="en-US" b="1" dirty="0" smtClean="0"/>
+              <a:rPr lang="en-US" b="1" dirty="0"/>
               <a:t>Speaker</a:t>
             </a:r>
             <a:r>
-              <a:rPr lang="en-US" b="1" baseline="0" dirty="0" smtClean="0"/>
+              <a:rPr lang="en-US" b="1" baseline="0" dirty="0"/>
               <a:t> Notes:</a:t>
             </a:r>
           </a:p>
           <a:p>
-            <a:endParaRPr lang="en-US" b="0" baseline="0" dirty="0" smtClean="0"/>
+            <a:endParaRPr lang="en-US" b="0" baseline="0" dirty="0"/>
           </a:p>
           <a:p>
             <a:r>
-              <a:rPr lang="en-US" b="0" baseline="0" dirty="0" smtClean="0"/>
+              <a:rPr lang="en-US" b="0" baseline="0" dirty="0"/>
               <a:t>2-3 minutes</a:t>
             </a:r>
           </a:p>
           <a:p>
-            <a:endParaRPr lang="en-US" b="0" baseline="0" dirty="0" smtClean="0"/>
+            <a:endParaRPr lang="en-US" b="0" baseline="0" dirty="0"/>
           </a:p>
           <a:p>
             <a:r>
-              <a:rPr lang="en-US" b="0" baseline="0" dirty="0" smtClean="0"/>
+              <a:rPr lang="en-US" b="0" baseline="0" dirty="0"/>
               <a:t>This scenario is to set the context of saving money using IaaS. Introduce Contoso (the SMB customer that will be used in the course scenarios) as a customer that want to save money and improve agility and efficiency by integrating Azure services into its infrastructure. This scenario helps the partner see how to compare the cost of on-premises infrastructure with Azure Infrastructure. The end result will be a cost/virtual machine. </a:t>
             </a:r>
           </a:p>
           <a:p>
-            <a:endParaRPr lang="en-US" b="0" baseline="0" dirty="0" smtClean="0"/>
+            <a:endParaRPr lang="en-US" b="0" baseline="0" dirty="0"/>
           </a:p>
           <a:p>
             <a:pPr marL="0" indent="0">
@@ -548,7 +547,7 @@
               <a:buNone/>
             </a:pPr>
             <a:r>
-              <a:rPr lang="en-US" sz="900" b="1" dirty="0" smtClean="0">
+              <a:rPr lang="en-US" sz="900" b="1" dirty="0">
                 <a:solidFill>
                   <a:srgbClr val="505050"/>
                 </a:solidFill>
@@ -556,7 +555,7 @@
               <a:t>Contoso</a:t>
             </a:r>
             <a:r>
-              <a:rPr lang="en-US" sz="900" dirty="0" smtClean="0">
+              <a:rPr lang="en-US" sz="900" dirty="0">
                 <a:solidFill>
                   <a:srgbClr val="505050"/>
                 </a:solidFill>
@@ -572,7 +571,7 @@
               <a:buNone/>
             </a:pPr>
             <a:r>
-              <a:rPr lang="en-US" sz="900" dirty="0" smtClean="0">
+              <a:rPr lang="en-US" sz="900" dirty="0">
                 <a:solidFill>
                   <a:srgbClr val="505050"/>
                 </a:solidFill>
@@ -587,7 +586,7 @@
               </a:lnSpc>
             </a:pPr>
             <a:r>
-              <a:rPr lang="en-US" sz="900" b="1" dirty="0" smtClean="0">
+              <a:rPr lang="en-US" sz="900" b="1" dirty="0">
                 <a:solidFill>
                   <a:srgbClr val="505050"/>
                 </a:solidFill>
@@ -602,7 +601,7 @@
               </a:lnSpc>
             </a:pPr>
             <a:r>
-              <a:rPr lang="en-US" sz="900" b="1" dirty="0" smtClean="0">
+              <a:rPr lang="en-US" sz="900" b="1" dirty="0">
                 <a:solidFill>
                   <a:srgbClr val="505050"/>
                 </a:solidFill>
@@ -617,7 +616,7 @@
               </a:lnSpc>
             </a:pPr>
             <a:r>
-              <a:rPr lang="en-US" sz="900" b="1" dirty="0" smtClean="0">
+              <a:rPr lang="en-US" sz="900" b="1" dirty="0">
                 <a:solidFill>
                   <a:srgbClr val="505050"/>
                 </a:solidFill>
@@ -632,7 +631,7 @@
               </a:lnSpc>
             </a:pPr>
             <a:r>
-              <a:rPr lang="en-US" sz="900" b="1" dirty="0" smtClean="0">
+              <a:rPr lang="en-US" sz="900" b="1" dirty="0">
                 <a:solidFill>
                   <a:srgbClr val="505050"/>
                 </a:solidFill>
@@ -648,7 +647,7 @@
               <a:buNone/>
             </a:pPr>
             <a:r>
-              <a:rPr lang="en-US" sz="900" dirty="0" smtClean="0">
+              <a:rPr lang="en-US" sz="900" dirty="0">
                 <a:solidFill>
                   <a:srgbClr val="505050"/>
                 </a:solidFill>
@@ -656,7 +655,7 @@
               <a:t>The total procurement and operating costs total about </a:t>
             </a:r>
             <a:r>
-              <a:rPr lang="en-US" sz="900" b="1" dirty="0" smtClean="0">
+              <a:rPr lang="en-US" sz="900" b="1" dirty="0">
                 <a:solidFill>
                   <a:srgbClr val="505050"/>
                 </a:solidFill>
@@ -664,7 +663,7 @@
               <a:t>$32,800 / 24 months </a:t>
             </a:r>
             <a:r>
-              <a:rPr lang="en-US" sz="900" dirty="0" smtClean="0">
+              <a:rPr lang="en-US" sz="900" dirty="0">
                 <a:solidFill>
                   <a:srgbClr val="505050"/>
                 </a:solidFill>
@@ -672,7 +671,7 @@
               <a:t>= </a:t>
             </a:r>
             <a:r>
-              <a:rPr lang="en-US" sz="900" b="1" dirty="0" smtClean="0">
+              <a:rPr lang="en-US" sz="900" b="1" dirty="0">
                 <a:solidFill>
                   <a:srgbClr val="505050"/>
                 </a:solidFill>
@@ -680,7 +679,7 @@
               <a:t>~$1333.33 /month </a:t>
             </a:r>
             <a:r>
-              <a:rPr lang="en-US" sz="900" dirty="0" smtClean="0">
+              <a:rPr lang="en-US" sz="900" dirty="0">
                 <a:solidFill>
                   <a:srgbClr val="505050"/>
                 </a:solidFill>
@@ -688,7 +687,7 @@
               <a:t>for two datacenter caliber servers. With 7 small virtual machines, this comes out to ~ </a:t>
             </a:r>
             <a:r>
-              <a:rPr lang="en-US" sz="900" b="1" dirty="0" smtClean="0">
+              <a:rPr lang="en-US" sz="900" b="1" dirty="0">
                 <a:solidFill>
                   <a:srgbClr val="505050"/>
                 </a:solidFill>
@@ -696,7 +695,7 @@
               <a:t>$1,90.47 per virtual machine</a:t>
             </a:r>
             <a:r>
-              <a:rPr lang="en-US" sz="900" dirty="0" smtClean="0">
+              <a:rPr lang="en-US" sz="900" dirty="0">
                 <a:solidFill>
                   <a:srgbClr val="505050"/>
                 </a:solidFill>
@@ -705,7 +704,7 @@
             </a:r>
           </a:p>
           <a:p>
-            <a:endParaRPr lang="en-US" b="0" baseline="0" dirty="0" smtClean="0"/>
+            <a:endParaRPr lang="en-US" b="0" baseline="0" dirty="0"/>
           </a:p>
           <a:p>
             <a:endParaRPr lang="en-US" b="1" dirty="0"/>
@@ -799,10 +798,9 @@
           </a:lstStyle>
           <a:p>
             <a:r>
-              <a:rPr lang="en-US" smtClean="0"/>
+              <a:rPr lang="en-US"/>
               <a:t>Click to edit Master title style</a:t>
             </a:r>
-            <a:endParaRPr lang="en-US"/>
           </a:p>
         </p:txBody>
       </p:sp>
@@ -864,10 +862,9 @@
           </a:lstStyle>
           <a:p>
             <a:r>
-              <a:rPr lang="en-US" smtClean="0"/>
+              <a:rPr lang="en-US"/>
               <a:t>Click to edit Master subtitle style</a:t>
             </a:r>
-            <a:endParaRPr lang="en-US"/>
           </a:p>
         </p:txBody>
       </p:sp>
@@ -888,7 +885,7 @@
           <a:p>
             <a:fld id="{DD6EF947-8D9F-492B-9CF5-9DCF2EF799ED}" type="datetimeFigureOut">
               <a:rPr lang="en-US" smtClean="0"/>
-              <a:t>9/23/2015</a:t>
+              <a:t>25-Mar-16</a:t>
             </a:fld>
             <a:endParaRPr lang="en-US"/>
           </a:p>
@@ -982,10 +979,9 @@
           <a:lstStyle/>
           <a:p>
             <a:r>
-              <a:rPr lang="en-US" smtClean="0"/>
+              <a:rPr lang="en-US"/>
               <a:t>Click to edit Master title style</a:t>
             </a:r>
-            <a:endParaRPr lang="en-US"/>
           </a:p>
         </p:txBody>
       </p:sp>
@@ -1006,38 +1002,37 @@
           <a:p>
             <a:pPr lvl="0"/>
             <a:r>
-              <a:rPr lang="en-US" smtClean="0"/>
+              <a:rPr lang="en-US"/>
               <a:t>Click to edit Master text styles</a:t>
             </a:r>
           </a:p>
           <a:p>
             <a:pPr lvl="1"/>
             <a:r>
-              <a:rPr lang="en-US" smtClean="0"/>
+              <a:rPr lang="en-US"/>
               <a:t>Second level</a:t>
             </a:r>
           </a:p>
           <a:p>
             <a:pPr lvl="2"/>
             <a:r>
-              <a:rPr lang="en-US" smtClean="0"/>
+              <a:rPr lang="en-US"/>
               <a:t>Third level</a:t>
             </a:r>
           </a:p>
           <a:p>
             <a:pPr lvl="3"/>
             <a:r>
-              <a:rPr lang="en-US" smtClean="0"/>
+              <a:rPr lang="en-US"/>
               <a:t>Fourth level</a:t>
             </a:r>
           </a:p>
           <a:p>
             <a:pPr lvl="4"/>
             <a:r>
-              <a:rPr lang="en-US" smtClean="0"/>
+              <a:rPr lang="en-US"/>
               <a:t>Fifth level</a:t>
             </a:r>
-            <a:endParaRPr lang="en-US"/>
           </a:p>
         </p:txBody>
       </p:sp>
@@ -1058,7 +1053,7 @@
           <a:p>
             <a:fld id="{DD6EF947-8D9F-492B-9CF5-9DCF2EF799ED}" type="datetimeFigureOut">
               <a:rPr lang="en-US" smtClean="0"/>
-              <a:t>9/23/2015</a:t>
+              <a:t>25-Mar-16</a:t>
             </a:fld>
             <a:endParaRPr lang="en-US"/>
           </a:p>
@@ -1157,10 +1152,9 @@
           <a:lstStyle/>
           <a:p>
             <a:r>
-              <a:rPr lang="en-US" smtClean="0"/>
+              <a:rPr lang="en-US"/>
               <a:t>Click to edit Master title style</a:t>
             </a:r>
-            <a:endParaRPr lang="en-US"/>
           </a:p>
         </p:txBody>
       </p:sp>
@@ -1186,38 +1180,37 @@
           <a:p>
             <a:pPr lvl="0"/>
             <a:r>
-              <a:rPr lang="en-US" smtClean="0"/>
+              <a:rPr lang="en-US"/>
               <a:t>Click to edit Master text styles</a:t>
             </a:r>
           </a:p>
           <a:p>
             <a:pPr lvl="1"/>
             <a:r>
-              <a:rPr lang="en-US" smtClean="0"/>
+              <a:rPr lang="en-US"/>
               <a:t>Second level</a:t>
             </a:r>
           </a:p>
           <a:p>
             <a:pPr lvl="2"/>
             <a:r>
-              <a:rPr lang="en-US" smtClean="0"/>
+              <a:rPr lang="en-US"/>
               <a:t>Third level</a:t>
             </a:r>
           </a:p>
           <a:p>
             <a:pPr lvl="3"/>
             <a:r>
-              <a:rPr lang="en-US" smtClean="0"/>
+              <a:rPr lang="en-US"/>
               <a:t>Fourth level</a:t>
             </a:r>
           </a:p>
           <a:p>
             <a:pPr lvl="4"/>
             <a:r>
-              <a:rPr lang="en-US" smtClean="0"/>
+              <a:rPr lang="en-US"/>
               <a:t>Fifth level</a:t>
             </a:r>
-            <a:endParaRPr lang="en-US"/>
           </a:p>
         </p:txBody>
       </p:sp>
@@ -1238,7 +1231,7 @@
           <a:p>
             <a:fld id="{DD6EF947-8D9F-492B-9CF5-9DCF2EF799ED}" type="datetimeFigureOut">
               <a:rPr lang="en-US" smtClean="0"/>
-              <a:t>9/23/2015</a:t>
+              <a:t>25-Mar-16</a:t>
             </a:fld>
             <a:endParaRPr lang="en-US"/>
           </a:p>
@@ -1355,10 +1348,9 @@
           </a:lstStyle>
           <a:p>
             <a:r>
-              <a:rPr lang="en-US" dirty="0" smtClean="0"/>
+              <a:rPr lang="en-US" dirty="0"/>
               <a:t>Click to edit Master title style</a:t>
             </a:r>
-            <a:endParaRPr lang="en-US" dirty="0"/>
           </a:p>
         </p:txBody>
       </p:sp>
@@ -1405,7 +1397,7 @@
           </a:lstStyle>
           <a:p>
             <a:r>
-              <a:rPr smtClean="0">
+              <a:rPr>
                 <a:gradFill>
                   <a:gsLst>
                     <a:gs pos="2239">
@@ -1420,19 +1412,6 @@
               </a:rPr>
               <a:t>Microsoft Confidential</a:t>
             </a:r>
-            <a:endParaRPr>
-              <a:gradFill>
-                <a:gsLst>
-                  <a:gs pos="2239">
-                    <a:srgbClr val="505050"/>
-                  </a:gs>
-                  <a:gs pos="11940">
-                    <a:srgbClr val="505050"/>
-                  </a:gs>
-                </a:gsLst>
-                <a:lin ang="5400000" scaled="0"/>
-              </a:gradFill>
-            </a:endParaRPr>
           </a:p>
         </p:txBody>
       </p:sp>
@@ -1475,7 +1454,7 @@
           <a:p>
             <a:pPr lvl="0"/>
             <a:r>
-              <a:rPr lang="en-US" dirty="0" smtClean="0"/>
+              <a:rPr lang="en-US" dirty="0"/>
               <a:t>Click to edit Master text styles</a:t>
             </a:r>
           </a:p>
@@ -1494,13 +1473,6 @@
   <p:transition>
     <p:fade/>
   </p:transition>
-  <p:timing>
-    <p:tnLst>
-      <p:par>
-        <p:cTn id="1" dur="indefinite" restart="never" nodeType="tmRoot"/>
-      </p:par>
-    </p:tnLst>
-  </p:timing>
 </p:sldLayout>
 </file>
 
@@ -1537,10 +1509,9 @@
           <a:lstStyle/>
           <a:p>
             <a:r>
-              <a:rPr lang="en-US" smtClean="0"/>
+              <a:rPr lang="en-US"/>
               <a:t>Click to edit Master title style</a:t>
             </a:r>
-            <a:endParaRPr lang="en-US"/>
           </a:p>
         </p:txBody>
       </p:sp>
@@ -1561,38 +1532,37 @@
           <a:p>
             <a:pPr lvl="0"/>
             <a:r>
-              <a:rPr lang="en-US" smtClean="0"/>
+              <a:rPr lang="en-US"/>
               <a:t>Click to edit Master text styles</a:t>
             </a:r>
           </a:p>
           <a:p>
             <a:pPr lvl="1"/>
             <a:r>
-              <a:rPr lang="en-US" smtClean="0"/>
+              <a:rPr lang="en-US"/>
               <a:t>Second level</a:t>
             </a:r>
           </a:p>
           <a:p>
             <a:pPr lvl="2"/>
             <a:r>
-              <a:rPr lang="en-US" smtClean="0"/>
+              <a:rPr lang="en-US"/>
               <a:t>Third level</a:t>
             </a:r>
           </a:p>
           <a:p>
             <a:pPr lvl="3"/>
             <a:r>
-              <a:rPr lang="en-US" smtClean="0"/>
+              <a:rPr lang="en-US"/>
               <a:t>Fourth level</a:t>
             </a:r>
           </a:p>
           <a:p>
             <a:pPr lvl="4"/>
             <a:r>
-              <a:rPr lang="en-US" smtClean="0"/>
+              <a:rPr lang="en-US"/>
               <a:t>Fifth level</a:t>
             </a:r>
-            <a:endParaRPr lang="en-US"/>
           </a:p>
         </p:txBody>
       </p:sp>
@@ -1613,7 +1583,7 @@
           <a:p>
             <a:fld id="{DD6EF947-8D9F-492B-9CF5-9DCF2EF799ED}" type="datetimeFigureOut">
               <a:rPr lang="en-US" smtClean="0"/>
-              <a:t>9/23/2015</a:t>
+              <a:t>25-Mar-16</a:t>
             </a:fld>
             <a:endParaRPr lang="en-US"/>
           </a:p>
@@ -1716,10 +1686,9 @@
           </a:lstStyle>
           <a:p>
             <a:r>
-              <a:rPr lang="en-US" smtClean="0"/>
+              <a:rPr lang="en-US"/>
               <a:t>Click to edit Master title style</a:t>
             </a:r>
-            <a:endParaRPr lang="en-US"/>
           </a:p>
         </p:txBody>
       </p:sp>
@@ -1836,7 +1805,7 @@
           <a:p>
             <a:pPr lvl="0"/>
             <a:r>
-              <a:rPr lang="en-US" smtClean="0"/>
+              <a:rPr lang="en-US"/>
               <a:t>Click to edit Master text styles</a:t>
             </a:r>
           </a:p>
@@ -1859,7 +1828,7 @@
           <a:p>
             <a:fld id="{DD6EF947-8D9F-492B-9CF5-9DCF2EF799ED}" type="datetimeFigureOut">
               <a:rPr lang="en-US" smtClean="0"/>
-              <a:t>9/23/2015</a:t>
+              <a:t>25-Mar-16</a:t>
             </a:fld>
             <a:endParaRPr lang="en-US"/>
           </a:p>
@@ -1953,10 +1922,9 @@
           <a:lstStyle/>
           <a:p>
             <a:r>
-              <a:rPr lang="en-US" smtClean="0"/>
+              <a:rPr lang="en-US"/>
               <a:t>Click to edit Master title style</a:t>
             </a:r>
-            <a:endParaRPr lang="en-US"/>
           </a:p>
         </p:txBody>
       </p:sp>
@@ -1982,38 +1950,37 @@
           <a:p>
             <a:pPr lvl="0"/>
             <a:r>
-              <a:rPr lang="en-US" smtClean="0"/>
+              <a:rPr lang="en-US"/>
               <a:t>Click to edit Master text styles</a:t>
             </a:r>
           </a:p>
           <a:p>
             <a:pPr lvl="1"/>
             <a:r>
-              <a:rPr lang="en-US" smtClean="0"/>
+              <a:rPr lang="en-US"/>
               <a:t>Second level</a:t>
             </a:r>
           </a:p>
           <a:p>
             <a:pPr lvl="2"/>
             <a:r>
-              <a:rPr lang="en-US" smtClean="0"/>
+              <a:rPr lang="en-US"/>
               <a:t>Third level</a:t>
             </a:r>
           </a:p>
           <a:p>
             <a:pPr lvl="3"/>
             <a:r>
-              <a:rPr lang="en-US" smtClean="0"/>
+              <a:rPr lang="en-US"/>
               <a:t>Fourth level</a:t>
             </a:r>
           </a:p>
           <a:p>
             <a:pPr lvl="4"/>
             <a:r>
-              <a:rPr lang="en-US" smtClean="0"/>
+              <a:rPr lang="en-US"/>
               <a:t>Fifth level</a:t>
             </a:r>
-            <a:endParaRPr lang="en-US"/>
           </a:p>
         </p:txBody>
       </p:sp>
@@ -2039,38 +2006,37 @@
           <a:p>
             <a:pPr lvl="0"/>
             <a:r>
-              <a:rPr lang="en-US" smtClean="0"/>
+              <a:rPr lang="en-US"/>
               <a:t>Click to edit Master text styles</a:t>
             </a:r>
           </a:p>
           <a:p>
             <a:pPr lvl="1"/>
             <a:r>
-              <a:rPr lang="en-US" smtClean="0"/>
+              <a:rPr lang="en-US"/>
               <a:t>Second level</a:t>
             </a:r>
           </a:p>
           <a:p>
             <a:pPr lvl="2"/>
             <a:r>
-              <a:rPr lang="en-US" smtClean="0"/>
+              <a:rPr lang="en-US"/>
               <a:t>Third level</a:t>
             </a:r>
           </a:p>
           <a:p>
             <a:pPr lvl="3"/>
             <a:r>
-              <a:rPr lang="en-US" smtClean="0"/>
+              <a:rPr lang="en-US"/>
               <a:t>Fourth level</a:t>
             </a:r>
           </a:p>
           <a:p>
             <a:pPr lvl="4"/>
             <a:r>
-              <a:rPr lang="en-US" smtClean="0"/>
+              <a:rPr lang="en-US"/>
               <a:t>Fifth level</a:t>
             </a:r>
-            <a:endParaRPr lang="en-US"/>
           </a:p>
         </p:txBody>
       </p:sp>
@@ -2091,7 +2057,7 @@
           <a:p>
             <a:fld id="{DD6EF947-8D9F-492B-9CF5-9DCF2EF799ED}" type="datetimeFigureOut">
               <a:rPr lang="en-US" smtClean="0"/>
-              <a:t>9/23/2015</a:t>
+              <a:t>25-Mar-16</a:t>
             </a:fld>
             <a:endParaRPr lang="en-US"/>
           </a:p>
@@ -2190,10 +2156,9 @@
           <a:lstStyle/>
           <a:p>
             <a:r>
-              <a:rPr lang="en-US" smtClean="0"/>
+              <a:rPr lang="en-US"/>
               <a:t>Click to edit Master title style</a:t>
             </a:r>
-            <a:endParaRPr lang="en-US"/>
           </a:p>
         </p:txBody>
       </p:sp>
@@ -2256,7 +2221,7 @@
           <a:p>
             <a:pPr lvl="0"/>
             <a:r>
-              <a:rPr lang="en-US" smtClean="0"/>
+              <a:rPr lang="en-US"/>
               <a:t>Click to edit Master text styles</a:t>
             </a:r>
           </a:p>
@@ -2284,38 +2249,37 @@
           <a:p>
             <a:pPr lvl="0"/>
             <a:r>
-              <a:rPr lang="en-US" smtClean="0"/>
+              <a:rPr lang="en-US"/>
               <a:t>Click to edit Master text styles</a:t>
             </a:r>
           </a:p>
           <a:p>
             <a:pPr lvl="1"/>
             <a:r>
-              <a:rPr lang="en-US" smtClean="0"/>
+              <a:rPr lang="en-US"/>
               <a:t>Second level</a:t>
             </a:r>
           </a:p>
           <a:p>
             <a:pPr lvl="2"/>
             <a:r>
-              <a:rPr lang="en-US" smtClean="0"/>
+              <a:rPr lang="en-US"/>
               <a:t>Third level</a:t>
             </a:r>
           </a:p>
           <a:p>
             <a:pPr lvl="3"/>
             <a:r>
-              <a:rPr lang="en-US" smtClean="0"/>
+              <a:rPr lang="en-US"/>
               <a:t>Fourth level</a:t>
             </a:r>
           </a:p>
           <a:p>
             <a:pPr lvl="4"/>
             <a:r>
-              <a:rPr lang="en-US" smtClean="0"/>
+              <a:rPr lang="en-US"/>
               <a:t>Fifth level</a:t>
             </a:r>
-            <a:endParaRPr lang="en-US"/>
           </a:p>
         </p:txBody>
       </p:sp>
@@ -2378,7 +2342,7 @@
           <a:p>
             <a:pPr lvl="0"/>
             <a:r>
-              <a:rPr lang="en-US" smtClean="0"/>
+              <a:rPr lang="en-US"/>
               <a:t>Click to edit Master text styles</a:t>
             </a:r>
           </a:p>
@@ -2406,38 +2370,37 @@
           <a:p>
             <a:pPr lvl="0"/>
             <a:r>
-              <a:rPr lang="en-US" smtClean="0"/>
+              <a:rPr lang="en-US"/>
               <a:t>Click to edit Master text styles</a:t>
             </a:r>
           </a:p>
           <a:p>
             <a:pPr lvl="1"/>
             <a:r>
-              <a:rPr lang="en-US" smtClean="0"/>
+              <a:rPr lang="en-US"/>
               <a:t>Second level</a:t>
             </a:r>
           </a:p>
           <a:p>
             <a:pPr lvl="2"/>
             <a:r>
-              <a:rPr lang="en-US" smtClean="0"/>
+              <a:rPr lang="en-US"/>
               <a:t>Third level</a:t>
             </a:r>
           </a:p>
           <a:p>
             <a:pPr lvl="3"/>
             <a:r>
-              <a:rPr lang="en-US" smtClean="0"/>
+              <a:rPr lang="en-US"/>
               <a:t>Fourth level</a:t>
             </a:r>
           </a:p>
           <a:p>
             <a:pPr lvl="4"/>
             <a:r>
-              <a:rPr lang="en-US" smtClean="0"/>
+              <a:rPr lang="en-US"/>
               <a:t>Fifth level</a:t>
             </a:r>
-            <a:endParaRPr lang="en-US"/>
           </a:p>
         </p:txBody>
       </p:sp>
@@ -2458,7 +2421,7 @@
           <a:p>
             <a:fld id="{DD6EF947-8D9F-492B-9CF5-9DCF2EF799ED}" type="datetimeFigureOut">
               <a:rPr lang="en-US" smtClean="0"/>
-              <a:t>9/23/2015</a:t>
+              <a:t>25-Mar-16</a:t>
             </a:fld>
             <a:endParaRPr lang="en-US"/>
           </a:p>
@@ -2552,10 +2515,9 @@
           <a:lstStyle/>
           <a:p>
             <a:r>
-              <a:rPr lang="en-US" smtClean="0"/>
+              <a:rPr lang="en-US"/>
               <a:t>Click to edit Master title style</a:t>
             </a:r>
-            <a:endParaRPr lang="en-US"/>
           </a:p>
         </p:txBody>
       </p:sp>
@@ -2576,7 +2538,7 @@
           <a:p>
             <a:fld id="{DD6EF947-8D9F-492B-9CF5-9DCF2EF799ED}" type="datetimeFigureOut">
               <a:rPr lang="en-US" smtClean="0"/>
-              <a:t>9/23/2015</a:t>
+              <a:t>25-Mar-16</a:t>
             </a:fld>
             <a:endParaRPr lang="en-US"/>
           </a:p>
@@ -2671,7 +2633,7 @@
           <a:p>
             <a:fld id="{DD6EF947-8D9F-492B-9CF5-9DCF2EF799ED}" type="datetimeFigureOut">
               <a:rPr lang="en-US" smtClean="0"/>
-              <a:t>9/23/2015</a:t>
+              <a:t>25-Mar-16</a:t>
             </a:fld>
             <a:endParaRPr lang="en-US"/>
           </a:p>
@@ -2774,10 +2736,9 @@
           </a:lstStyle>
           <a:p>
             <a:r>
-              <a:rPr lang="en-US" smtClean="0"/>
+              <a:rPr lang="en-US"/>
               <a:t>Click to edit Master title style</a:t>
             </a:r>
-            <a:endParaRPr lang="en-US"/>
           </a:p>
         </p:txBody>
       </p:sp>
@@ -2831,38 +2792,37 @@
           <a:p>
             <a:pPr lvl="0"/>
             <a:r>
-              <a:rPr lang="en-US" smtClean="0"/>
+              <a:rPr lang="en-US"/>
               <a:t>Click to edit Master text styles</a:t>
             </a:r>
           </a:p>
           <a:p>
             <a:pPr lvl="1"/>
             <a:r>
-              <a:rPr lang="en-US" smtClean="0"/>
+              <a:rPr lang="en-US"/>
               <a:t>Second level</a:t>
             </a:r>
           </a:p>
           <a:p>
             <a:pPr lvl="2"/>
             <a:r>
-              <a:rPr lang="en-US" smtClean="0"/>
+              <a:rPr lang="en-US"/>
               <a:t>Third level</a:t>
             </a:r>
           </a:p>
           <a:p>
             <a:pPr lvl="3"/>
             <a:r>
-              <a:rPr lang="en-US" smtClean="0"/>
+              <a:rPr lang="en-US"/>
               <a:t>Fourth level</a:t>
             </a:r>
           </a:p>
           <a:p>
             <a:pPr lvl="4"/>
             <a:r>
-              <a:rPr lang="en-US" smtClean="0"/>
+              <a:rPr lang="en-US"/>
               <a:t>Fifth level</a:t>
             </a:r>
-            <a:endParaRPr lang="en-US"/>
           </a:p>
         </p:txBody>
       </p:sp>
@@ -2925,7 +2885,7 @@
           <a:p>
             <a:pPr lvl="0"/>
             <a:r>
-              <a:rPr lang="en-US" smtClean="0"/>
+              <a:rPr lang="en-US"/>
               <a:t>Click to edit Master text styles</a:t>
             </a:r>
           </a:p>
@@ -2948,7 +2908,7 @@
           <a:p>
             <a:fld id="{DD6EF947-8D9F-492B-9CF5-9DCF2EF799ED}" type="datetimeFigureOut">
               <a:rPr lang="en-US" smtClean="0"/>
-              <a:t>9/23/2015</a:t>
+              <a:t>25-Mar-16</a:t>
             </a:fld>
             <a:endParaRPr lang="en-US"/>
           </a:p>
@@ -3051,10 +3011,9 @@
           </a:lstStyle>
           <a:p>
             <a:r>
-              <a:rPr lang="en-US" smtClean="0"/>
+              <a:rPr lang="en-US"/>
               <a:t>Click to edit Master title style</a:t>
             </a:r>
-            <a:endParaRPr lang="en-US"/>
           </a:p>
         </p:txBody>
       </p:sp>
@@ -3178,7 +3137,7 @@
           <a:p>
             <a:pPr lvl="0"/>
             <a:r>
-              <a:rPr lang="en-US" smtClean="0"/>
+              <a:rPr lang="en-US"/>
               <a:t>Click to edit Master text styles</a:t>
             </a:r>
           </a:p>
@@ -3201,7 +3160,7 @@
           <a:p>
             <a:fld id="{DD6EF947-8D9F-492B-9CF5-9DCF2EF799ED}" type="datetimeFigureOut">
               <a:rPr lang="en-US" smtClean="0"/>
-              <a:t>9/23/2015</a:t>
+              <a:t>25-Mar-16</a:t>
             </a:fld>
             <a:endParaRPr lang="en-US"/>
           </a:p>
@@ -3310,10 +3269,9 @@
           <a:lstStyle/>
           <a:p>
             <a:r>
-              <a:rPr lang="en-US" smtClean="0"/>
+              <a:rPr lang="en-US"/>
               <a:t>Click to edit Master title style</a:t>
             </a:r>
-            <a:endParaRPr lang="en-US"/>
           </a:p>
         </p:txBody>
       </p:sp>
@@ -3344,38 +3302,37 @@
           <a:p>
             <a:pPr lvl="0"/>
             <a:r>
-              <a:rPr lang="en-US" smtClean="0"/>
+              <a:rPr lang="en-US"/>
               <a:t>Click to edit Master text styles</a:t>
             </a:r>
           </a:p>
           <a:p>
             <a:pPr lvl="1"/>
             <a:r>
-              <a:rPr lang="en-US" smtClean="0"/>
+              <a:rPr lang="en-US"/>
               <a:t>Second level</a:t>
             </a:r>
           </a:p>
           <a:p>
             <a:pPr lvl="2"/>
             <a:r>
-              <a:rPr lang="en-US" smtClean="0"/>
+              <a:rPr lang="en-US"/>
               <a:t>Third level</a:t>
             </a:r>
           </a:p>
           <a:p>
             <a:pPr lvl="3"/>
             <a:r>
-              <a:rPr lang="en-US" smtClean="0"/>
+              <a:rPr lang="en-US"/>
               <a:t>Fourth level</a:t>
             </a:r>
           </a:p>
           <a:p>
             <a:pPr lvl="4"/>
             <a:r>
-              <a:rPr lang="en-US" smtClean="0"/>
+              <a:rPr lang="en-US"/>
               <a:t>Fifth level</a:t>
             </a:r>
-            <a:endParaRPr lang="en-US"/>
           </a:p>
         </p:txBody>
       </p:sp>
@@ -3414,7 +3371,7 @@
           <a:p>
             <a:fld id="{DD6EF947-8D9F-492B-9CF5-9DCF2EF799ED}" type="datetimeFigureOut">
               <a:rPr lang="en-US" smtClean="0"/>
-              <a:t>9/23/2015</a:t>
+              <a:t>25-Mar-16</a:t>
             </a:fld>
             <a:endParaRPr lang="en-US"/>
           </a:p>
@@ -4121,7 +4078,7 @@
           <a:lstStyle/>
           <a:p>
             <a:r>
-              <a:rPr lang="en-US" dirty="0" smtClean="0">
+              <a:rPr lang="en-US" dirty="0">
                 <a:solidFill>
                   <a:srgbClr val="0072C6"/>
                 </a:solidFill>
@@ -4164,7 +4121,7 @@
               </a:lnSpc>
             </a:pPr>
             <a:r>
-              <a:rPr lang="en-US" sz="2000" b="1" dirty="0" smtClean="0">
+              <a:rPr lang="en-US" sz="2000" b="1" dirty="0">
                 <a:solidFill>
                   <a:srgbClr val="FFFFFF"/>
                 </a:solidFill>
@@ -4173,7 +4130,7 @@
               <a:t>High Level Architecture</a:t>
             </a:r>
             <a:r>
-              <a:rPr lang="en-US" sz="2000" dirty="0" smtClean="0">
+              <a:rPr lang="en-US" sz="2000" dirty="0">
                 <a:solidFill>
                   <a:srgbClr val="FFFFFF"/>
                 </a:solidFill>
@@ -4181,12 +4138,6 @@
               </a:rPr>
               <a:t>* </a:t>
             </a:r>
-            <a:endParaRPr lang="en-US" sz="2000" dirty="0">
-              <a:solidFill>
-                <a:srgbClr val="FFFFFF"/>
-              </a:solidFill>
-              <a:latin typeface="+mj-lt"/>
-            </a:endParaRPr>
           </a:p>
         </p:txBody>
       </p:sp>
@@ -4218,24 +4169,18 @@
               </a:lnSpc>
             </a:pPr>
             <a:r>
-              <a:rPr lang="en-US" sz="1400" dirty="0" smtClean="0">
+              <a:rPr lang="en-US" sz="1400" dirty="0">
                 <a:latin typeface="+mj-lt"/>
                 <a:hlinkClick r:id="rId3"/>
               </a:rPr>
               <a:t>Pricing and Purchase Guidance Reference</a:t>
             </a:r>
-            <a:r>
-              <a:rPr lang="en-US" sz="1400" dirty="0" smtClean="0">
-                <a:latin typeface="+mj-lt"/>
-              </a:rPr>
-              <a:t/>
-            </a:r>
             <a:br>
-              <a:rPr lang="en-US" sz="1400" dirty="0" smtClean="0">
+              <a:rPr lang="en-US" sz="1400" dirty="0">
                 <a:latin typeface="+mj-lt"/>
               </a:rPr>
             </a:br>
-            <a:endParaRPr lang="en-US" sz="1400" dirty="0" smtClean="0">
+            <a:endParaRPr lang="en-US" sz="1400" dirty="0">
               <a:latin typeface="+mj-lt"/>
             </a:endParaRPr>
           </a:p>
@@ -4247,7 +4192,17 @@
             </a:pPr>
             <a:r>
               <a:rPr lang="en-US" sz="1400" dirty="0"/>
-              <a:t>Request full version of Azure Starter Kits online through MPN </a:t>
+              <a:t>Request full version of Azure Starter Kits online through </a:t>
+            </a:r>
+            <a:r>
+              <a:rPr lang="en-US" sz="1400" dirty="0">
+                <a:hlinkClick r:id="rId4"/>
+              </a:rPr>
+              <a:t>MPN</a:t>
+            </a:r>
+            <a:r>
+              <a:rPr lang="en-US" sz="1400" dirty="0"/>
+              <a:t> </a:t>
             </a:r>
           </a:p>
         </p:txBody>
@@ -4280,7 +4235,7 @@
               </a:lnSpc>
             </a:pPr>
             <a:r>
-              <a:rPr lang="en-US" sz="2000" b="1" dirty="0" smtClean="0">
+              <a:rPr lang="en-US" sz="2000" b="1" dirty="0">
                 <a:solidFill>
                   <a:srgbClr val="FFFFFF"/>
                 </a:solidFill>
@@ -4288,12 +4243,6 @@
               </a:rPr>
               <a:t>The Problem</a:t>
             </a:r>
-            <a:endParaRPr lang="en-US" sz="2000" b="1" dirty="0">
-              <a:solidFill>
-                <a:srgbClr val="FFFFFF"/>
-              </a:solidFill>
-              <a:latin typeface="+mj-lt"/>
-            </a:endParaRPr>
           </a:p>
           <a:p>
             <a:pPr>
@@ -4321,11 +4270,6 @@
               </a:rPr>
               <a:t>As an IT Administrator, you need to assure the continuity of the operations on the company and prepare a Disaster Recovery Plan in case of an emergency. An information technology disaster recovery plan (IT DRP) should be developed in conjunction with the business continuity plan. </a:t>
             </a:r>
-            <a:endParaRPr lang="en-US" sz="1300" dirty="0" smtClean="0">
-              <a:solidFill>
-                <a:schemeClr val="bg1"/>
-              </a:solidFill>
-            </a:endParaRPr>
           </a:p>
           <a:p>
             <a:pPr>
@@ -4357,7 +4301,7 @@
                 <a:spcPct val="90000"/>
               </a:lnSpc>
             </a:pPr>
-            <a:endParaRPr lang="en-US" sz="1300" dirty="0" smtClean="0">
+            <a:endParaRPr lang="en-US" sz="1300" dirty="0">
               <a:solidFill>
                 <a:schemeClr val="bg1"/>
               </a:solidFill>
@@ -4382,7 +4326,7 @@
               </a:lnSpc>
             </a:pPr>
             <a:r>
-              <a:rPr lang="en-US" sz="1300" dirty="0" smtClean="0">
+              <a:rPr lang="en-US" sz="1300" dirty="0">
                 <a:solidFill>
                   <a:schemeClr val="bg1"/>
                 </a:solidFill>
@@ -4427,15 +4371,7 @@
                   <a:srgbClr val="FFFFFF"/>
                 </a:solidFill>
               </a:rPr>
-              <a:t>Disaster recovery solutions with synchronous replication are </a:t>
-            </a:r>
-            <a:r>
-              <a:rPr lang="en-GB" sz="1300" dirty="0" smtClean="0">
-                <a:solidFill>
-                  <a:srgbClr val="FFFFFF"/>
-                </a:solidFill>
-              </a:rPr>
-              <a:t>expensive</a:t>
+              <a:t>Disaster recovery solutions with synchronous replication are expensive</a:t>
             </a:r>
           </a:p>
           <a:p>
@@ -4523,16 +4459,7 @@
                 </a:solidFill>
                 <a:latin typeface="+mj-lt"/>
               </a:rPr>
-              <a:t>Microsoft </a:t>
-            </a:r>
-            <a:r>
-              <a:rPr lang="en-US" sz="2000" b="1" dirty="0" smtClean="0">
-                <a:solidFill>
-                  <a:srgbClr val="FFFFFF"/>
-                </a:solidFill>
-                <a:latin typeface="+mj-lt"/>
-              </a:rPr>
-              <a:t>Solution</a:t>
+              <a:t>Microsoft Solution</a:t>
             </a:r>
           </a:p>
           <a:p>
@@ -4562,11 +4489,6 @@
               </a:rPr>
               <a:t>In response to many customer requests for DR on Microsoft Azure, Microsoft developed Azure Site Recovery (ASR), which enables the failover of Hyper-V and VMware VMs, as well as physical instances that are running on-premises to Microsoft Azure. </a:t>
             </a:r>
-            <a:endParaRPr lang="en-US" sz="1300" dirty="0" smtClean="0">
-              <a:solidFill>
-                <a:srgbClr val="FFFFFF"/>
-              </a:solidFill>
-            </a:endParaRPr>
           </a:p>
           <a:p>
             <a:pPr>
@@ -4587,20 +4509,12 @@
               </a:lnSpc>
             </a:pPr>
             <a:r>
-              <a:rPr lang="en-US" sz="1300" dirty="0" smtClean="0">
-                <a:solidFill>
-                  <a:srgbClr val="FFFFFF"/>
-                </a:solidFill>
-              </a:rPr>
-              <a:t>Azure </a:t>
-            </a:r>
-            <a:r>
               <a:rPr lang="en-US" sz="1300" dirty="0">
                 <a:solidFill>
                   <a:srgbClr val="FFFFFF"/>
                 </a:solidFill>
               </a:rPr>
-              <a:t>Site Recovery protects mission-critical applications with automated replication-based DR of physical and virtual machines. Servers can be protected to targets that are on-premises, at a hosting service provider, or on the Azure cloud. </a:t>
+              <a:t>Azure Site Recovery protects mission-critical applications with automated replication-based DR of physical and virtual machines. Servers can be protected to targets that are on-premises, at a hosting service provider, or on the Azure cloud. </a:t>
             </a:r>
           </a:p>
         </p:txBody>
@@ -4633,7 +4547,7 @@
               </a:lnSpc>
             </a:pPr>
             <a:r>
-              <a:rPr lang="en-US" sz="2000" b="1" dirty="0" smtClean="0">
+              <a:rPr lang="en-US" sz="2000" b="1" dirty="0">
                 <a:solidFill>
                   <a:srgbClr val="FFFFFF"/>
                 </a:solidFill>
@@ -4641,7 +4555,7 @@
               </a:rPr>
               <a:t>Microsoft Azure Pricing </a:t>
             </a:r>
-            <a:endParaRPr lang="en-US" sz="1200" b="1" dirty="0" smtClean="0">
+            <a:endParaRPr lang="en-US" sz="1200" b="1" dirty="0">
               <a:solidFill>
                 <a:schemeClr val="bg1"/>
               </a:solidFill>
@@ -5114,7 +5028,7 @@
               </a:lnSpc>
             </a:pPr>
             <a:r>
-              <a:rPr lang="en-US" sz="1400" dirty="0" smtClean="0"/>
+              <a:rPr lang="en-US" sz="1400" dirty="0"/>
               <a:t>*More Detail &amp; Components– Starter Kit Archiving and Backup IP </a:t>
             </a:r>
             <a:endParaRPr lang="en-US" sz="1400" dirty="0">
@@ -5177,7 +5091,7 @@
           <a:p>
             <a:pPr marL="52912" algn="l"/>
             <a:r>
-              <a:rPr lang="en-US" spc="-69" dirty="0" smtClean="0">
+              <a:rPr lang="en-US" spc="-69" dirty="0">
                 <a:solidFill>
                   <a:schemeClr val="tx2">
                     <a:lumMod val="40000"/>
@@ -5188,15 +5102,6 @@
               </a:rPr>
               <a:t>Space for local promotion</a:t>
             </a:r>
-            <a:endParaRPr lang="en-US" spc="-69" dirty="0">
-              <a:solidFill>
-                <a:schemeClr val="tx2">
-                  <a:lumMod val="40000"/>
-                  <a:lumOff val="60000"/>
-                </a:schemeClr>
-              </a:solidFill>
-              <a:latin typeface="Segoe UI"/>
-            </a:endParaRPr>
           </a:p>
         </p:txBody>
       </p:sp>
@@ -6110,7 +6015,7 @@
           <p:nvPr/>
         </p:nvPicPr>
         <p:blipFill>
-          <a:blip r:embed="rId4" cstate="email">
+          <a:blip r:embed="rId5" cstate="email">
             <a:biLevel thresh="50000"/>
             <a:extLst>
               <a:ext uri="{28A0092B-C50C-407E-A947-70E740481C1C}">
@@ -6175,7 +6080,7 @@
           <p:nvPr/>
         </p:nvPicPr>
         <p:blipFill>
-          <a:blip r:embed="rId5" cstate="email">
+          <a:blip r:embed="rId6" cstate="email">
             <a:biLevel thresh="25000"/>
             <a:extLst>
               <a:ext uri="{28A0092B-C50C-407E-A947-70E740481C1C}">
@@ -7489,12 +7394,8 @@
                 </a:spcAft>
               </a:pPr>
               <a:r>
-                <a:rPr lang="en-US" sz="800" dirty="0" smtClean="0"/>
+                <a:rPr lang="en-US" sz="800" dirty="0"/>
                 <a:t>: </a:t>
-              </a:r>
-              <a:r>
-                <a:rPr lang="en-US" sz="800" dirty="0"/>
-                <a:t/>
               </a:r>
               <a:br>
                 <a:rPr lang="en-US" sz="800" dirty="0"/>
@@ -10051,18 +9952,13 @@
               </a:spcAft>
             </a:pPr>
             <a:r>
-              <a:rPr lang="en-US" sz="800" kern="0" dirty="0" smtClean="0">
+              <a:rPr lang="en-US" sz="800" kern="0" dirty="0">
                 <a:solidFill>
                   <a:schemeClr val="bg1"/>
                 </a:solidFill>
               </a:rPr>
               <a:t>On- premise to On-premise</a:t>
             </a:r>
-            <a:endParaRPr lang="en-US" sz="800" kern="0" dirty="0">
-              <a:solidFill>
-                <a:schemeClr val="bg1"/>
-              </a:solidFill>
-            </a:endParaRPr>
           </a:p>
         </p:txBody>
       </p:sp>
@@ -12463,18 +12359,13 @@
               </a:spcAft>
             </a:pPr>
             <a:r>
-              <a:rPr lang="en-US" sz="800" kern="0" dirty="0" smtClean="0">
+              <a:rPr lang="en-US" sz="800" kern="0" dirty="0">
                 <a:solidFill>
                   <a:schemeClr val="bg1"/>
                 </a:solidFill>
               </a:rPr>
               <a:t>On- premise to Microsoft Azure</a:t>
             </a:r>
-            <a:endParaRPr lang="en-US" sz="800" kern="0" dirty="0">
-              <a:solidFill>
-                <a:schemeClr val="bg1"/>
-              </a:solidFill>
-            </a:endParaRPr>
           </a:p>
         </p:txBody>
       </p:sp>
@@ -12504,21 +12395,21 @@
                 <a:gridCol w="706582">
                   <a:extLst>
                     <a:ext uri="{9D8B030D-6E8A-4147-A177-3AD203B41FA5}">
-                      <a16:colId xmlns="" xmlns:a16="http://schemas.microsoft.com/office/drawing/2014/main" val="4019129754"/>
+                      <a16:colId xmlns:a16="http://schemas.microsoft.com/office/drawing/2014/main" val="4019129754"/>
                     </a:ext>
                   </a:extLst>
                 </a:gridCol>
                 <a:gridCol w="914400">
                   <a:extLst>
                     <a:ext uri="{9D8B030D-6E8A-4147-A177-3AD203B41FA5}">
-                      <a16:colId xmlns="" xmlns:a16="http://schemas.microsoft.com/office/drawing/2014/main" val="58874956"/>
+                      <a16:colId xmlns:a16="http://schemas.microsoft.com/office/drawing/2014/main" val="58874956"/>
                     </a:ext>
                   </a:extLst>
                 </a:gridCol>
                 <a:gridCol w="896958">
                   <a:extLst>
                     <a:ext uri="{9D8B030D-6E8A-4147-A177-3AD203B41FA5}">
-                      <a16:colId xmlns="" xmlns:a16="http://schemas.microsoft.com/office/drawing/2014/main" val="667867989"/>
+                      <a16:colId xmlns:a16="http://schemas.microsoft.com/office/drawing/2014/main" val="667867989"/>
                     </a:ext>
                   </a:extLst>
                 </a:gridCol>
@@ -12594,7 +12485,7 @@
                         <a:defRPr/>
                       </a:pPr>
                       <a:r>
-                        <a:rPr lang="en-US" sz="800" kern="1200" dirty="0" smtClean="0">
+                        <a:rPr lang="en-US" sz="800" kern="1200" dirty="0">
                           <a:solidFill>
                             <a:schemeClr val="bg1"/>
                           </a:solidFill>
@@ -12604,14 +12495,6 @@
                         </a:rPr>
                         <a:t>Price For First 31 days</a:t>
                       </a:r>
-                      <a:endParaRPr lang="en-US" sz="800" kern="1200" dirty="0">
-                        <a:solidFill>
-                          <a:schemeClr val="bg1"/>
-                        </a:solidFill>
-                        <a:latin typeface="+mn-lt"/>
-                        <a:ea typeface="+mn-ea"/>
-                        <a:cs typeface="+mn-cs"/>
-                      </a:endParaRPr>
                     </a:p>
                   </a:txBody>
                   <a:tcPr anchor="ctr">
@@ -12678,7 +12561,7 @@
                         <a:defRPr/>
                       </a:pPr>
                       <a:r>
-                        <a:rPr lang="en-US" sz="800" kern="1200" dirty="0" smtClean="0">
+                        <a:rPr lang="en-US" sz="800" kern="1200" dirty="0">
                           <a:solidFill>
                             <a:schemeClr val="bg1"/>
                           </a:solidFill>
@@ -12689,7 +12572,7 @@
                         <a:t>Price</a:t>
                       </a:r>
                       <a:r>
-                        <a:rPr lang="en-US" sz="800" kern="1200" baseline="0" dirty="0" smtClean="0">
+                        <a:rPr lang="en-US" sz="800" kern="1200" baseline="0" dirty="0">
                           <a:solidFill>
                             <a:schemeClr val="bg1"/>
                           </a:solidFill>
@@ -12700,7 +12583,7 @@
                         <a:t> After </a:t>
                       </a:r>
                       <a:r>
-                        <a:rPr lang="en-US" sz="800" kern="1200" dirty="0" smtClean="0">
+                        <a:rPr lang="en-US" sz="800" kern="1200" dirty="0">
                           <a:solidFill>
                             <a:schemeClr val="bg1"/>
                           </a:solidFill>
@@ -12749,7 +12632,7 @@
                 </a:tc>
                 <a:extLst>
                   <a:ext uri="{0D108BD9-81ED-4DB2-BD59-A6C34878D82A}">
-                    <a16:rowId xmlns="" xmlns:a16="http://schemas.microsoft.com/office/drawing/2014/main" val="224810218"/>
+                    <a16:rowId xmlns:a16="http://schemas.microsoft.com/office/drawing/2014/main" val="224810218"/>
                   </a:ext>
                 </a:extLst>
               </a:tr>
@@ -12932,7 +12815,7 @@
                 </a:tc>
                 <a:extLst>
                   <a:ext uri="{0D108BD9-81ED-4DB2-BD59-A6C34878D82A}">
-                    <a16:rowId xmlns="" xmlns:a16="http://schemas.microsoft.com/office/drawing/2014/main" val="3745283907"/>
+                    <a16:rowId xmlns:a16="http://schemas.microsoft.com/office/drawing/2014/main" val="3745283907"/>
                   </a:ext>
                 </a:extLst>
               </a:tr>
@@ -13105,7 +12988,7 @@
                 </a:tc>
                 <a:extLst>
                   <a:ext uri="{0D108BD9-81ED-4DB2-BD59-A6C34878D82A}">
-                    <a16:rowId xmlns="" xmlns:a16="http://schemas.microsoft.com/office/drawing/2014/main" val="2686889812"/>
+                    <a16:rowId xmlns:a16="http://schemas.microsoft.com/office/drawing/2014/main" val="2686889812"/>
                   </a:ext>
                 </a:extLst>
               </a:tr>
@@ -13722,63 +13605,12 @@
               </a:lnSpc>
             </a:pPr>
             <a:r>
-              <a:rPr lang="en-US" sz="1200" b="1" dirty="0" smtClean="0">
+              <a:rPr lang="en-US" sz="1200" b="1" dirty="0">
                 <a:solidFill>
                   <a:schemeClr val="bg1"/>
                 </a:solidFill>
               </a:rPr>
               <a:t>Scenario DR – Protecting to Azure: </a:t>
-            </a:r>
-          </a:p>
-          <a:p>
-            <a:pPr marL="171450" indent="-171450">
-              <a:lnSpc>
-                <a:spcPct val="90000"/>
-              </a:lnSpc>
-              <a:buFont typeface="Wingdings" panose="05000000000000000000" pitchFamily="2" charset="2"/>
-              <a:buChar char="ü"/>
-            </a:pPr>
-            <a:r>
-              <a:rPr lang="en-US" sz="1100" dirty="0" smtClean="0">
-                <a:solidFill>
-                  <a:schemeClr val="bg1"/>
-                </a:solidFill>
-              </a:rPr>
-              <a:t>U$ 162/Month – 3 VMs Site Recovery</a:t>
-            </a:r>
-          </a:p>
-          <a:p>
-            <a:pPr marL="171450" indent="-171450">
-              <a:lnSpc>
-                <a:spcPct val="90000"/>
-              </a:lnSpc>
-              <a:buFont typeface="Wingdings" panose="05000000000000000000" pitchFamily="2" charset="2"/>
-              <a:buChar char="ü"/>
-            </a:pPr>
-            <a:r>
-              <a:rPr lang="en-US" sz="1100" dirty="0" smtClean="0">
-                <a:solidFill>
-                  <a:schemeClr val="bg1"/>
-                </a:solidFill>
-              </a:rPr>
-              <a:t>U$ 65.60/Month – 700 GB Storage</a:t>
-            </a:r>
-          </a:p>
-          <a:p>
-            <a:pPr marL="171450" indent="-171450">
-              <a:lnSpc>
-                <a:spcPct val="90000"/>
-              </a:lnSpc>
-              <a:buFont typeface="Wingdings" panose="05000000000000000000" pitchFamily="2" charset="2"/>
-              <a:buChar char="ü"/>
-            </a:pPr>
-            <a:r>
-              <a:rPr lang="en-US" sz="1100" dirty="0" smtClean="0">
-                <a:solidFill>
-                  <a:schemeClr val="bg1"/>
-                </a:solidFill>
-              </a:rPr>
-              <a:t>U$ 66.96/Month – VM A1/744 Hours</a:t>
             </a:r>
           </a:p>
           <a:p>
@@ -13795,31 +13627,7 @@
                   <a:schemeClr val="bg1"/>
                 </a:solidFill>
               </a:rPr>
-              <a:t>U$ </a:t>
-            </a:r>
-            <a:r>
-              <a:rPr lang="en-US" sz="1100" dirty="0" smtClean="0">
-                <a:solidFill>
-                  <a:schemeClr val="bg1"/>
-                </a:solidFill>
-              </a:rPr>
-              <a:t>27/Month </a:t>
-            </a:r>
-            <a:r>
-              <a:rPr lang="en-US" sz="1100" dirty="0">
-                <a:solidFill>
-                  <a:schemeClr val="bg1"/>
-                </a:solidFill>
-              </a:rPr>
-              <a:t>– VM </a:t>
-            </a:r>
-            <a:r>
-              <a:rPr lang="en-US" sz="1100" dirty="0" smtClean="0">
-                <a:solidFill>
-                  <a:schemeClr val="bg1"/>
-                </a:solidFill>
-              </a:rPr>
-              <a:t>A3/75 Hours</a:t>
+              <a:t>U$ 162/Month – 3 VMs Site Recovery</a:t>
             </a:r>
           </a:p>
           <a:p>
@@ -13831,7 +13639,58 @@
               <a:buChar char="ü"/>
             </a:pPr>
             <a:r>
-              <a:rPr lang="en-US" sz="1100" dirty="0" smtClean="0">
+              <a:rPr lang="en-US" sz="1100" dirty="0">
+                <a:solidFill>
+                  <a:schemeClr val="bg1"/>
+                </a:solidFill>
+              </a:rPr>
+              <a:t>U$ 65.60/Month – 700 GB Storage</a:t>
+            </a:r>
+          </a:p>
+          <a:p>
+            <a:pPr marL="171450" indent="-171450">
+              <a:lnSpc>
+                <a:spcPct val="90000"/>
+              </a:lnSpc>
+              <a:buFont typeface="Wingdings" panose="05000000000000000000" pitchFamily="2" charset="2"/>
+              <a:buChar char="ü"/>
+            </a:pPr>
+            <a:r>
+              <a:rPr lang="en-US" sz="1100" dirty="0">
+                <a:solidFill>
+                  <a:schemeClr val="bg1"/>
+                </a:solidFill>
+              </a:rPr>
+              <a:t>U$ 66.96/Month – VM A1/744 Hours</a:t>
+            </a:r>
+          </a:p>
+          <a:p>
+            <a:pPr marL="171450" indent="-171450">
+              <a:lnSpc>
+                <a:spcPct val="90000"/>
+              </a:lnSpc>
+              <a:buFont typeface="Wingdings" panose="05000000000000000000" pitchFamily="2" charset="2"/>
+              <a:buChar char="ü"/>
+            </a:pPr>
+            <a:r>
+              <a:rPr lang="en-US" sz="1100" dirty="0">
+                <a:solidFill>
+                  <a:schemeClr val="bg1"/>
+                </a:solidFill>
+              </a:rPr>
+              <a:t>U$ 27/Month – VM A3/75 Hours</a:t>
+            </a:r>
+          </a:p>
+          <a:p>
+            <a:pPr marL="171450" indent="-171450">
+              <a:lnSpc>
+                <a:spcPct val="90000"/>
+              </a:lnSpc>
+              <a:buFont typeface="Wingdings" panose="05000000000000000000" pitchFamily="2" charset="2"/>
+              <a:buChar char="ü"/>
+            </a:pPr>
+            <a:r>
+              <a:rPr lang="en-US" sz="1100" dirty="0">
                 <a:solidFill>
                   <a:schemeClr val="bg1"/>
                 </a:solidFill>
@@ -13839,7 +13698,7 @@
               <a:t>U$ 26.78/Month - VPN</a:t>
             </a:r>
             <a:br>
-              <a:rPr lang="en-US" sz="1100" dirty="0" smtClean="0">
+              <a:rPr lang="en-US" sz="1100" dirty="0">
                 <a:solidFill>
                   <a:schemeClr val="bg1"/>
                 </a:solidFill>
@@ -13860,14 +13719,14 @@
               <a:buChar char="ü"/>
             </a:pPr>
             <a:r>
-              <a:rPr lang="en-US" sz="1200" b="1" dirty="0" smtClean="0">
+              <a:rPr lang="en-US" sz="1200" b="1" dirty="0">
                 <a:solidFill>
                   <a:schemeClr val="bg1"/>
                 </a:solidFill>
               </a:rPr>
               <a:t>Total  U$ 4185.35/Year</a:t>
             </a:r>
-            <a:endParaRPr lang="en-US" sz="1200" b="1" dirty="0" smtClean="0">
+            <a:endParaRPr lang="en-US" sz="1200" b="1" dirty="0">
               <a:solidFill>
                 <a:schemeClr val="bg1"/>
               </a:solidFill>
@@ -13883,7 +13742,7 @@
               <a:buChar char="ü"/>
             </a:pPr>
             <a:r>
-              <a:rPr lang="en-US" sz="1200" b="1" smtClean="0">
+              <a:rPr lang="en-US" sz="1200" b="1">
                 <a:solidFill>
                   <a:schemeClr val="bg1"/>
                 </a:solidFill>
@@ -13896,21 +13755,8 @@
                   <a:schemeClr val="bg1"/>
                 </a:solidFill>
               </a:rPr>
-              <a:t>Azure Monetary Commitment in OPEN </a:t>
+              <a:t>Azure Monetary Commitment in OPEN SKUs</a:t>
             </a:r>
-            <a:r>
-              <a:rPr lang="en-US" sz="1200" b="1" dirty="0" smtClean="0">
-                <a:solidFill>
-                  <a:schemeClr val="bg1"/>
-                </a:solidFill>
-              </a:rPr>
-              <a:t>SKUs</a:t>
-            </a:r>
-            <a:endParaRPr lang="en-US" sz="1200" b="1" dirty="0">
-              <a:solidFill>
-                <a:schemeClr val="bg1"/>
-              </a:solidFill>
-            </a:endParaRPr>
           </a:p>
           <a:p>
             <a:pPr>
@@ -13979,13 +13825,6 @@
       <p:transition/>
     </mc:Fallback>
   </mc:AlternateContent>
-  <p:timing>
-    <p:tnLst>
-      <p:par>
-        <p:cTn id="1" dur="indefinite" restart="never" nodeType="tmRoot"/>
-      </p:par>
-    </p:tnLst>
-  </p:timing>
 </p:sld>
 </file>
 
@@ -14022,10 +13861,9 @@
           <a:lstStyle/>
           <a:p>
             <a:r>
-              <a:rPr lang="es-MX" dirty="0" smtClean="0"/>
+              <a:rPr lang="es-MX" dirty="0"/>
               <a:t>More References</a:t>
             </a:r>
-            <a:endParaRPr lang="es-MX" dirty="0"/>
           </a:p>
         </p:txBody>
       </p:sp>
@@ -14056,12 +13894,8 @@
               <a:buChar char="•"/>
             </a:pPr>
             <a:r>
-              <a:rPr lang="en-US" sz="1800" dirty="0" smtClean="0"/>
-              <a:t>Partner Technical Services – Request Azure Pre-Sales and Deployment support For Partners:</a:t>
-            </a:r>
-            <a:r>
               <a:rPr lang="en-US" sz="1800" dirty="0"/>
-              <a:t>  </a:t>
+              <a:t>Partner Technical Services – Request Azure Pre-Sales and Deployment support For Partners:  </a:t>
             </a:r>
             <a:r>
               <a:rPr lang="en-US" sz="1800" dirty="0">
@@ -14076,7 +13910,7 @@
               <a:buFont typeface="Arial" panose="020B0604020202020204" pitchFamily="34" charset="0"/>
               <a:buChar char="•"/>
             </a:pPr>
-            <a:endParaRPr lang="en-US" sz="1800" dirty="0" smtClean="0"/>
+            <a:endParaRPr lang="en-US" sz="1800" dirty="0"/>
           </a:p>
           <a:p>
             <a:pPr marL="342900" indent="-342900">
@@ -14131,7 +13965,7 @@
               </a:rPr>
               <a:t>https://azure.microsoft.com/en-us/documentation/articles/site-recovery-faq</a:t>
             </a:r>
-            <a:endParaRPr lang="en-US" sz="1800" b="1" dirty="0" smtClean="0"/>
+            <a:endParaRPr lang="en-US" sz="1800" b="1" dirty="0"/>
           </a:p>
           <a:p>
             <a:endParaRPr lang="es-MX" sz="1800" dirty="0"/>
@@ -14151,13 +13985,6 @@
   <p:transition>
     <p:fade/>
   </p:transition>
-  <p:timing>
-    <p:tnLst>
-      <p:par>
-        <p:cTn id="1" dur="indefinite" restart="never" nodeType="tmRoot"/>
-      </p:par>
-    </p:tnLst>
-  </p:timing>
 </p:sld>
 </file>
 
@@ -14684,63 +14511,6 @@
 </file>
 
 <file path=customXml/item1.xml><?xml version="1.0" encoding="utf-8"?>
-<?mso-contentType ?>
-<FormTemplates xmlns="http://schemas.microsoft.com/sharepoint/v3/contenttype/forms">
-  <Display>DocumentLibraryForm</Display>
-  <Edit>DocumentLibraryForm</Edit>
-  <New>DocumentLibraryForm</New>
-</FormTemplates>
-</file>
-
-<file path=customXml/item2.xml><?xml version="1.0" encoding="utf-8"?>
-<p:properties xmlns:p="http://schemas.microsoft.com/office/2006/metadata/properties" xmlns:xsi="http://www.w3.org/2001/XMLSchema-instance" xmlns:pc="http://schemas.microsoft.com/office/infopath/2007/PartnerControls">
-  <documentManagement>
-    <SharedWithUsers xmlns="1e9946e3-f9a0-41e4-9b22-58e2cc8fa95c">
-      <UserInfo>
-        <DisplayName>Arturo Vazquez Alvarez</DisplayName>
-        <AccountId>791</AccountId>
-        <AccountType/>
-      </UserInfo>
-      <UserInfo>
-        <DisplayName>Jonathan Gonzalez Flores</DisplayName>
-        <AccountId>1048</AccountId>
-        <AccountType/>
-      </UserInfo>
-      <UserInfo>
-        <DisplayName>Jose Miguel Izaguirre Garate (MXP Industrial S.A. DE C.V.)</DisplayName>
-        <AccountId>548</AccountId>
-        <AccountType/>
-      </UserInfo>
-      <UserInfo>
-        <DisplayName>Alejandro Garcia Sanchez (MXP Industrial S.A. DE C.V.)</DisplayName>
-        <AccountId>8223</AccountId>
-        <AccountType/>
-      </UserInfo>
-      <UserInfo>
-        <DisplayName>Gabriela Treviño Moreno (MXP Industrial S.A. DE C.V.)</DisplayName>
-        <AccountId>1414</AccountId>
-        <AccountType/>
-      </UserInfo>
-      <UserInfo>
-        <DisplayName>Fabiola Ochoa Rubalcava</DisplayName>
-        <AccountId>8224</AccountId>
-        <AccountType/>
-      </UserInfo>
-      <UserInfo>
-        <DisplayName>Marin Irepan Gembe Gonzalez (MXP Industrial S.A. DE C.V.)</DisplayName>
-        <AccountId>8225</AccountId>
-        <AccountType/>
-      </UserInfo>
-    </SharedWithUsers>
-    <_ShortcutUrl xmlns="d998fb76-9a2a-468e-b3b9-73e6011ded53">
-      <Url xsi:nil="true"/>
-      <Description xsi:nil="true"/>
-    </_ShortcutUrl>
-  </documentManagement>
-</p:properties>
-</file>
-
-<file path=customXml/item3.xml><?xml version="1.0" encoding="utf-8"?>
 <ct:contentTypeSchema xmlns:ct="http://schemas.microsoft.com/office/2006/metadata/contentType" xmlns:ma="http://schemas.microsoft.com/office/2006/metadata/properties/metaAttributes" ct:_="" ma:_="" ma:contentTypeName="Document" ma:contentTypeID="0x010100AB7F171FDBFD134D9DB5CFD30BF9EBF2" ma:contentTypeVersion="3" ma:contentTypeDescription="Create a new document." ma:contentTypeScope="" ma:versionID="402f8dca69ab7acfac722918f8e9d211">
   <xsd:schema xmlns:xsd="http://www.w3.org/2001/XMLSchema" xmlns:xs="http://www.w3.org/2001/XMLSchema" xmlns:p="http://schemas.microsoft.com/office/2006/metadata/properties" xmlns:ns2="d998fb76-9a2a-468e-b3b9-73e6011ded53" xmlns:ns3="1e9946e3-f9a0-41e4-9b22-58e2cc8fa95c" targetNamespace="http://schemas.microsoft.com/office/2006/metadata/properties" ma:root="true" ma:fieldsID="1be315c11ab3ee19185f326326b6632f" ns2:_="" ns3:_="">
     <xsd:import namespace="d998fb76-9a2a-468e-b3b9-73e6011ded53"/>
@@ -14906,10 +14676,78 @@
 </ct:contentTypeSchema>
 </file>
 
+<file path=customXml/item2.xml><?xml version="1.0" encoding="utf-8"?>
+<p:properties xmlns:p="http://schemas.microsoft.com/office/2006/metadata/properties" xmlns:xsi="http://www.w3.org/2001/XMLSchema-instance" xmlns:pc="http://schemas.microsoft.com/office/infopath/2007/PartnerControls">
+  <documentManagement>
+    <SharedWithUsers xmlns="1e9946e3-f9a0-41e4-9b22-58e2cc8fa95c">
+      <UserInfo>
+        <DisplayName>Arturo Vazquez Alvarez</DisplayName>
+        <AccountId>791</AccountId>
+        <AccountType/>
+      </UserInfo>
+      <UserInfo>
+        <DisplayName>Jonathan Gonzalez Flores</DisplayName>
+        <AccountId>1048</AccountId>
+        <AccountType/>
+      </UserInfo>
+      <UserInfo>
+        <DisplayName>Jose Miguel Izaguirre Garate (MXP Industrial S.A. DE C.V.)</DisplayName>
+        <AccountId>548</AccountId>
+        <AccountType/>
+      </UserInfo>
+      <UserInfo>
+        <DisplayName>Alejandro Garcia Sanchez (MXP Industrial S.A. DE C.V.)</DisplayName>
+        <AccountId>8223</AccountId>
+        <AccountType/>
+      </UserInfo>
+      <UserInfo>
+        <DisplayName>Gabriela Treviño Moreno (MXP Industrial S.A. DE C.V.)</DisplayName>
+        <AccountId>1414</AccountId>
+        <AccountType/>
+      </UserInfo>
+      <UserInfo>
+        <DisplayName>Fabiola Ochoa Rubalcava</DisplayName>
+        <AccountId>8224</AccountId>
+        <AccountType/>
+      </UserInfo>
+      <UserInfo>
+        <DisplayName>Marin Irepan Gembe Gonzalez (MXP Industrial S.A. DE C.V.)</DisplayName>
+        <AccountId>8225</AccountId>
+        <AccountType/>
+      </UserInfo>
+    </SharedWithUsers>
+    <_ShortcutUrl xmlns="d998fb76-9a2a-468e-b3b9-73e6011ded53">
+      <Url xsi:nil="true"/>
+      <Description xsi:nil="true"/>
+    </_ShortcutUrl>
+  </documentManagement>
+</p:properties>
+</file>
+
+<file path=customXml/item3.xml><?xml version="1.0" encoding="utf-8"?>
+<?mso-contentType ?>
+<FormTemplates xmlns="http://schemas.microsoft.com/sharepoint/v3/contenttype/forms">
+  <Display>DocumentLibraryForm</Display>
+  <Edit>DocumentLibraryForm</Edit>
+  <New>DocumentLibraryForm</New>
+</FormTemplates>
+</file>
+
 <file path=customXml/itemProps1.xml><?xml version="1.0" encoding="utf-8"?>
-<ds:datastoreItem xmlns:ds="http://schemas.openxmlformats.org/officeDocument/2006/customXml" ds:itemID="{1547E796-3336-4CA3-A039-C51122E80770}">
+<ds:datastoreItem xmlns:ds="http://schemas.openxmlformats.org/officeDocument/2006/customXml" ds:itemID="{E814C6E7-17FA-4328-94D9-CA25C9666788}">
   <ds:schemaRefs>
-    <ds:schemaRef ds:uri="http://schemas.microsoft.com/sharepoint/v3/contenttype/forms"/>
+    <ds:schemaRef ds:uri="http://schemas.microsoft.com/office/2006/metadata/contentType"/>
+    <ds:schemaRef ds:uri="http://schemas.microsoft.com/office/2006/metadata/properties/metaAttributes"/>
+    <ds:schemaRef ds:uri="http://www.w3.org/2001/XMLSchema"/>
+    <ds:schemaRef ds:uri="http://schemas.microsoft.com/office/2006/metadata/properties"/>
+    <ds:schemaRef ds:uri="d998fb76-9a2a-468e-b3b9-73e6011ded53"/>
+    <ds:schemaRef ds:uri="1e9946e3-f9a0-41e4-9b22-58e2cc8fa95c"/>
+    <ds:schemaRef ds:uri="http://schemas.microsoft.com/office/2006/documentManagement/types"/>
+    <ds:schemaRef ds:uri="http://schemas.microsoft.com/office/infopath/2007/PartnerControls"/>
+    <ds:schemaRef ds:uri="http://schemas.openxmlformats.org/package/2006/metadata/core-properties"/>
+    <ds:schemaRef ds:uri="http://purl.org/dc/elements/1.1/"/>
+    <ds:schemaRef ds:uri="http://purl.org/dc/terms/"/>
+    <ds:schemaRef ds:uri="http://schemas.microsoft.com/internal/obd"/>
   </ds:schemaRefs>
 </ds:datastoreItem>
 </file>
@@ -14932,20 +14770,9 @@
 </file>
 
 <file path=customXml/itemProps3.xml><?xml version="1.0" encoding="utf-8"?>
-<ds:datastoreItem xmlns:ds="http://schemas.openxmlformats.org/officeDocument/2006/customXml" ds:itemID="{E814C6E7-17FA-4328-94D9-CA25C9666788}">
+<ds:datastoreItem xmlns:ds="http://schemas.openxmlformats.org/officeDocument/2006/customXml" ds:itemID="{1547E796-3336-4CA3-A039-C51122E80770}">
   <ds:schemaRefs>
-    <ds:schemaRef ds:uri="http://schemas.microsoft.com/office/2006/metadata/contentType"/>
-    <ds:schemaRef ds:uri="http://schemas.microsoft.com/office/2006/metadata/properties/metaAttributes"/>
-    <ds:schemaRef ds:uri="http://www.w3.org/2001/XMLSchema"/>
-    <ds:schemaRef ds:uri="http://schemas.microsoft.com/office/2006/metadata/properties"/>
-    <ds:schemaRef ds:uri="d998fb76-9a2a-468e-b3b9-73e6011ded53"/>
-    <ds:schemaRef ds:uri="1e9946e3-f9a0-41e4-9b22-58e2cc8fa95c"/>
-    <ds:schemaRef ds:uri="http://schemas.microsoft.com/office/2006/documentManagement/types"/>
-    <ds:schemaRef ds:uri="http://schemas.microsoft.com/office/infopath/2007/PartnerControls"/>
-    <ds:schemaRef ds:uri="http://schemas.openxmlformats.org/package/2006/metadata/core-properties"/>
-    <ds:schemaRef ds:uri="http://purl.org/dc/elements/1.1/"/>
-    <ds:schemaRef ds:uri="http://purl.org/dc/terms/"/>
-    <ds:schemaRef ds:uri="http://schemas.microsoft.com/internal/obd"/>
+    <ds:schemaRef ds:uri="http://schemas.microsoft.com/sharepoint/v3/contenttype/forms"/>
   </ds:schemaRefs>
 </ds:datastoreItem>
 </file>
</xml_diff>